<commit_message>
week-7 knapsack algorithm latex fixed for parsing problem
</commit_message>
<xml_diff>
--- a/docs/week-7/ce100-week-7-knapsack.en.md_word.pptx
+++ b/docs/week-7/ce100-week-7-knapsack.en.md_word.pptx
@@ -19417,31 +19417,802 @@
           </a:p>
         </p:txBody>
       </p:sp>
-      <p:sp>
-        <p:nvSpPr>
-          <p:cNvPr id="3" name="Content Placeholder 2"/>
-          <p:cNvSpPr>
-            <a:spLocks noGrp="1"/>
-          </p:cNvSpPr>
-          <p:nvPr>
-            <p:ph idx="1"/>
-          </p:nvPr>
-        </p:nvSpPr>
-        <p:spPr/>
-        <p:txBody>
-          <a:bodyPr/>
-          <a:lstStyle/>
-          <a:p>
-            <a:pPr lvl="0" indent="0" marL="0">
-              <a:buNone/>
-            </a:pPr>
-            <a:r>
-              <a:rPr/>
-              <a:t>$$  $$</a:t>
-            </a:r>
-          </a:p>
-        </p:txBody>
-      </p:sp>
+      <mc:AlternateContent xmlns:mc="http://schemas.openxmlformats.org/markup-compatibility/2006">
+        <mc:Choice xmlns:a14="http://schemas.microsoft.com/office/drawing/2010/main" Requires="a14">
+          <p:sp>
+            <p:nvSpPr>
+              <p:cNvPr id="3" name="Content Placeholder 2"/>
+              <p:cNvSpPr>
+                <a:spLocks noGrp="1"/>
+              </p:cNvSpPr>
+              <p:nvPr>
+                <p:ph idx="1"/>
+              </p:nvPr>
+            </p:nvSpPr>
+            <p:spPr/>
+            <p:txBody>
+              <a:bodyPr/>
+              <a:lstStyle/>
+              <a:p>
+                <a:pPr lvl="0" indent="0" marL="0">
+                  <a:buNone/>
+                </a:pPr>
+                <a14:m>
+                  <m:oMathPara xmlns:m="http://schemas.openxmlformats.org/officeDocument/2006/math">
+                    <m:oMathParaPr>
+                      <m:jc m:val="center"/>
+                    </m:oMathParaPr>
+                    <m:oMath>
+                      <m:m>
+                        <m:mPr>
+                          <m:baseJc m:val="center"/>
+                          <m:plcHide m:val="1"/>
+                          <m:mcs>
+                            <m:mc>
+                              <m:mcPr>
+                                <m:mcJc m:val="right"/>
+                                <m:count m:val="1"/>
+                              </m:mcPr>
+                            </m:mc>
+                            <m:mc>
+                              <m:mcPr>
+                                <m:mcJc m:val="left"/>
+                                <m:count m:val="1"/>
+                              </m:mcPr>
+                            </m:mc>
+                          </m:mcs>
+                        </m:mPr>
+                        <m:mr>
+                          <m:e/>
+                          <m:e>
+                            <m:r>
+                              <m:rPr>
+                                <m:nor/>
+                                <m:sty m:val="p"/>
+                              </m:rPr>
+                              <m:t>KNAP0-1</m:t>
+                            </m:r>
+                            <m:d>
+                              <m:dPr>
+                                <m:begChr m:val="("/>
+                                <m:endChr m:val=")"/>
+                                <m:sepChr m:val=""/>
+                                <m:grow/>
+                              </m:dPr>
+                              <m:e>
+                                <m:r>
+                                  <m:t>v</m:t>
+                                </m:r>
+                                <m:r>
+                                  <m:rPr>
+                                    <m:sty m:val="p"/>
+                                  </m:rPr>
+                                  <m:t>,</m:t>
+                                </m:r>
+                                <m:r>
+                                  <m:t>w</m:t>
+                                </m:r>
+                                <m:r>
+                                  <m:rPr>
+                                    <m:sty m:val="p"/>
+                                  </m:rPr>
+                                  <m:t>,</m:t>
+                                </m:r>
+                                <m:r>
+                                  <m:t>n</m:t>
+                                </m:r>
+                                <m:r>
+                                  <m:rPr>
+                                    <m:sty m:val="p"/>
+                                  </m:rPr>
+                                  <m:t>,</m:t>
+                                </m:r>
+                                <m:r>
+                                  <m:t>W</m:t>
+                                </m:r>
+                              </m:e>
+                            </m:d>
+                          </m:e>
+                        </m:mr>
+                        <m:mr>
+                          <m:e/>
+                          <m:e>
+                            <m:r>
+                              <m:t> </m:t>
+                            </m:r>
+                            <m:r>
+                              <m:rPr>
+                                <m:nor/>
+                                <m:sty m:val="p"/>
+                              </m:rPr>
+                              <m:t>for</m:t>
+                            </m:r>
+                            <m:r>
+                              <m:t> </m:t>
+                            </m:r>
+                            <m:r>
+                              <m:t>ω</m:t>
+                            </m:r>
+                            <m:r>
+                              <m:rPr>
+                                <m:sty m:val="p"/>
+                              </m:rPr>
+                              <m:t>←</m:t>
+                            </m:r>
+                            <m:r>
+                              <m:t>0</m:t>
+                            </m:r>
+                            <m:r>
+                              <m:t> </m:t>
+                            </m:r>
+                            <m:r>
+                              <m:rPr>
+                                <m:nor/>
+                                <m:sty m:val="p"/>
+                              </m:rPr>
+                              <m:t>to</m:t>
+                            </m:r>
+                            <m:r>
+                              <m:t> </m:t>
+                            </m:r>
+                            <m:r>
+                              <m:t>W</m:t>
+                            </m:r>
+                            <m:r>
+                              <m:t> </m:t>
+                            </m:r>
+                            <m:r>
+                              <m:rPr>
+                                <m:nor/>
+                                <m:sty m:val="p"/>
+                              </m:rPr>
+                              <m:t>do</m:t>
+                            </m:r>
+                          </m:e>
+                        </m:mr>
+                        <m:mr>
+                          <m:e/>
+                          <m:e>
+                            <m:r>
+                              <m:t>  </m:t>
+                            </m:r>
+                            <m:r>
+                              <m:t>c</m:t>
+                            </m:r>
+                            <m:d>
+                              <m:dPr>
+                                <m:begChr m:val="["/>
+                                <m:endChr m:val="]"/>
+                                <m:sepChr m:val=""/>
+                                <m:grow/>
+                              </m:dPr>
+                              <m:e>
+                                <m:r>
+                                  <m:t>0</m:t>
+                                </m:r>
+                                <m:r>
+                                  <m:rPr>
+                                    <m:sty m:val="p"/>
+                                  </m:rPr>
+                                  <m:t>,</m:t>
+                                </m:r>
+                                <m:r>
+                                  <m:t>ω</m:t>
+                                </m:r>
+                              </m:e>
+                            </m:d>
+                            <m:r>
+                              <m:rPr>
+                                <m:sty m:val="p"/>
+                              </m:rPr>
+                              <m:t>←</m:t>
+                            </m:r>
+                            <m:r>
+                              <m:t>0</m:t>
+                            </m:r>
+                          </m:e>
+                        </m:mr>
+                        <m:mr>
+                          <m:e/>
+                          <m:e>
+                            <m:r>
+                              <m:t> </m:t>
+                            </m:r>
+                            <m:r>
+                              <m:rPr>
+                                <m:nor/>
+                                <m:sty m:val="p"/>
+                              </m:rPr>
+                              <m:t>for</m:t>
+                            </m:r>
+                            <m:r>
+                              <m:t> </m:t>
+                            </m:r>
+                            <m:r>
+                              <m:t>i</m:t>
+                            </m:r>
+                            <m:r>
+                              <m:rPr>
+                                <m:sty m:val="p"/>
+                              </m:rPr>
+                              <m:t>←</m:t>
+                            </m:r>
+                            <m:r>
+                              <m:t>0</m:t>
+                            </m:r>
+                            <m:r>
+                              <m:t> </m:t>
+                            </m:r>
+                            <m:r>
+                              <m:rPr>
+                                <m:nor/>
+                                <m:sty m:val="p"/>
+                              </m:rPr>
+                              <m:t>to</m:t>
+                            </m:r>
+                            <m:r>
+                              <m:t> </m:t>
+                            </m:r>
+                            <m:r>
+                              <m:t>m</m:t>
+                            </m:r>
+                            <m:r>
+                              <m:t> </m:t>
+                            </m:r>
+                            <m:r>
+                              <m:rPr>
+                                <m:nor/>
+                                <m:sty m:val="p"/>
+                              </m:rPr>
+                              <m:t>do</m:t>
+                            </m:r>
+                          </m:e>
+                        </m:mr>
+                        <m:mr>
+                          <m:e/>
+                          <m:e>
+                            <m:r>
+                              <m:t>  </m:t>
+                            </m:r>
+                            <m:r>
+                              <m:t>c</m:t>
+                            </m:r>
+                            <m:d>
+                              <m:dPr>
+                                <m:begChr m:val="["/>
+                                <m:endChr m:val="]"/>
+                                <m:sepChr m:val=""/>
+                                <m:grow/>
+                              </m:dPr>
+                              <m:e>
+                                <m:r>
+                                  <m:t>i</m:t>
+                                </m:r>
+                                <m:r>
+                                  <m:rPr>
+                                    <m:sty m:val="p"/>
+                                  </m:rPr>
+                                  <m:t>,</m:t>
+                                </m:r>
+                                <m:r>
+                                  <m:t>0</m:t>
+                                </m:r>
+                              </m:e>
+                            </m:d>
+                            <m:r>
+                              <m:rPr>
+                                <m:sty m:val="p"/>
+                              </m:rPr>
+                              <m:t>←</m:t>
+                            </m:r>
+                            <m:r>
+                              <m:t>0</m:t>
+                            </m:r>
+                          </m:e>
+                        </m:mr>
+                        <m:mr>
+                          <m:e/>
+                          <m:e>
+                            <m:r>
+                              <m:t> </m:t>
+                            </m:r>
+                            <m:r>
+                              <m:rPr>
+                                <m:nor/>
+                                <m:sty m:val="p"/>
+                              </m:rPr>
+                              <m:t>for</m:t>
+                            </m:r>
+                            <m:r>
+                              <m:t> </m:t>
+                            </m:r>
+                            <m:r>
+                              <m:t>i</m:t>
+                            </m:r>
+                            <m:r>
+                              <m:rPr>
+                                <m:sty m:val="p"/>
+                              </m:rPr>
+                              <m:t>←</m:t>
+                            </m:r>
+                            <m:r>
+                              <m:t>0</m:t>
+                            </m:r>
+                            <m:r>
+                              <m:t> </m:t>
+                            </m:r>
+                            <m:r>
+                              <m:rPr>
+                                <m:nor/>
+                                <m:sty m:val="p"/>
+                              </m:rPr>
+                              <m:t>to</m:t>
+                            </m:r>
+                            <m:r>
+                              <m:t> </m:t>
+                            </m:r>
+                            <m:r>
+                              <m:t>m</m:t>
+                            </m:r>
+                            <m:r>
+                              <m:t> </m:t>
+                            </m:r>
+                            <m:r>
+                              <m:rPr>
+                                <m:nor/>
+                                <m:sty m:val="p"/>
+                              </m:rPr>
+                              <m:t>do</m:t>
+                            </m:r>
+                          </m:e>
+                        </m:mr>
+                        <m:mr>
+                          <m:e/>
+                          <m:e>
+                            <m:r>
+                              <m:t>  </m:t>
+                            </m:r>
+                            <m:r>
+                              <m:t> </m:t>
+                            </m:r>
+                            <m:r>
+                              <m:rPr>
+                                <m:nor/>
+                                <m:sty m:val="p"/>
+                              </m:rPr>
+                              <m:t>for</m:t>
+                            </m:r>
+                            <m:r>
+                              <m:t> </m:t>
+                            </m:r>
+                            <m:r>
+                              <m:t>ω</m:t>
+                            </m:r>
+                            <m:r>
+                              <m:rPr>
+                                <m:sty m:val="p"/>
+                              </m:rPr>
+                              <m:t>←</m:t>
+                            </m:r>
+                            <m:r>
+                              <m:t>1</m:t>
+                            </m:r>
+                            <m:r>
+                              <m:t> </m:t>
+                            </m:r>
+                            <m:r>
+                              <m:rPr>
+                                <m:nor/>
+                                <m:sty m:val="p"/>
+                              </m:rPr>
+                              <m:t>to</m:t>
+                            </m:r>
+                            <m:r>
+                              <m:t> </m:t>
+                            </m:r>
+                            <m:r>
+                              <m:t>W</m:t>
+                            </m:r>
+                            <m:r>
+                              <m:t> </m:t>
+                            </m:r>
+                            <m:r>
+                              <m:rPr>
+                                <m:nor/>
+                                <m:sty m:val="p"/>
+                              </m:rPr>
+                              <m:t>do</m:t>
+                            </m:r>
+                          </m:e>
+                        </m:mr>
+                        <m:mr>
+                          <m:e/>
+                          <m:e>
+                            <m:r>
+                              <m:t>  </m:t>
+                            </m:r>
+                            <m:r>
+                              <m:t>  </m:t>
+                            </m:r>
+                            <m:r>
+                              <m:rPr>
+                                <m:nor/>
+                                <m:sty m:val="p"/>
+                              </m:rPr>
+                              <m:t>if</m:t>
+                            </m:r>
+                            <m:r>
+                              <m:t> </m:t>
+                            </m:r>
+                            <m:sSub>
+                              <m:e>
+                                <m:r>
+                                  <m:t>w</m:t>
+                                </m:r>
+                              </m:e>
+                              <m:sub>
+                                <m:r>
+                                  <m:t>i</m:t>
+                                </m:r>
+                              </m:sub>
+                            </m:sSub>
+                            <m:r>
+                              <m:rPr>
+                                <m:sty m:val="p"/>
+                              </m:rPr>
+                              <m:t>≤</m:t>
+                            </m:r>
+                            <m:r>
+                              <m:t>ω</m:t>
+                            </m:r>
+                            <m:r>
+                              <m:t> </m:t>
+                            </m:r>
+                            <m:r>
+                              <m:rPr>
+                                <m:nor/>
+                                <m:sty m:val="p"/>
+                              </m:rPr>
+                              <m:t>then</m:t>
+                            </m:r>
+                          </m:e>
+                        </m:mr>
+                        <m:mr>
+                          <m:e/>
+                          <m:e>
+                            <m:r>
+                              <m:t>  </m:t>
+                            </m:r>
+                            <m:r>
+                              <m:t>  </m:t>
+                            </m:r>
+                            <m:r>
+                              <m:t> </m:t>
+                            </m:r>
+                            <m:r>
+                              <m:t>c</m:t>
+                            </m:r>
+                            <m:d>
+                              <m:dPr>
+                                <m:begChr m:val="["/>
+                                <m:endChr m:val="]"/>
+                                <m:sepChr m:val=""/>
+                                <m:grow/>
+                              </m:dPr>
+                              <m:e>
+                                <m:r>
+                                  <m:t>i</m:t>
+                                </m:r>
+                                <m:r>
+                                  <m:rPr>
+                                    <m:sty m:val="p"/>
+                                  </m:rPr>
+                                  <m:t>,</m:t>
+                                </m:r>
+                                <m:r>
+                                  <m:t>ω</m:t>
+                                </m:r>
+                              </m:e>
+                            </m:d>
+                            <m:r>
+                              <m:rPr>
+                                <m:sty m:val="p"/>
+                              </m:rPr>
+                              <m:t>←</m:t>
+                            </m:r>
+                            <m:r>
+                              <m:t>m</m:t>
+                            </m:r>
+                            <m:r>
+                              <m:t>a</m:t>
+                            </m:r>
+                            <m:r>
+                              <m:t>x</m:t>
+                            </m:r>
+                            <m:r>
+                              <m:rPr>
+                                <m:sty m:val="p"/>
+                              </m:rPr>
+                              <m:t>{</m:t>
+                            </m:r>
+                            <m:sSub>
+                              <m:e>
+                                <m:r>
+                                  <m:t>v</m:t>
+                                </m:r>
+                              </m:e>
+                              <m:sub>
+                                <m:r>
+                                  <m:t>i</m:t>
+                                </m:r>
+                              </m:sub>
+                            </m:sSub>
+                            <m:r>
+                              <m:rPr>
+                                <m:sty m:val="p"/>
+                              </m:rPr>
+                              <m:t>+</m:t>
+                            </m:r>
+                            <m:r>
+                              <m:t>c</m:t>
+                            </m:r>
+                            <m:d>
+                              <m:dPr>
+                                <m:begChr m:val="["/>
+                                <m:endChr m:val="]"/>
+                                <m:sepChr m:val=""/>
+                                <m:grow/>
+                              </m:dPr>
+                              <m:e>
+                                <m:r>
+                                  <m:t>i</m:t>
+                                </m:r>
+                                <m:r>
+                                  <m:rPr>
+                                    <m:sty m:val="p"/>
+                                  </m:rPr>
+                                  <m:t>−</m:t>
+                                </m:r>
+                                <m:r>
+                                  <m:t>1</m:t>
+                                </m:r>
+                                <m:r>
+                                  <m:rPr>
+                                    <m:sty m:val="p"/>
+                                  </m:rPr>
+                                  <m:t>,</m:t>
+                                </m:r>
+                                <m:r>
+                                  <m:t>ω</m:t>
+                                </m:r>
+                                <m:r>
+                                  <m:rPr>
+                                    <m:sty m:val="p"/>
+                                  </m:rPr>
+                                  <m:t>−</m:t>
+                                </m:r>
+                                <m:sSub>
+                                  <m:e>
+                                    <m:r>
+                                      <m:t>w</m:t>
+                                    </m:r>
+                                  </m:e>
+                                  <m:sub>
+                                    <m:r>
+                                      <m:t>i</m:t>
+                                    </m:r>
+                                  </m:sub>
+                                </m:sSub>
+                              </m:e>
+                            </m:d>
+                            <m:r>
+                              <m:rPr>
+                                <m:sty m:val="p"/>
+                              </m:rPr>
+                              <m:t>,</m:t>
+                            </m:r>
+                            <m:r>
+                              <m:t>c</m:t>
+                            </m:r>
+                            <m:d>
+                              <m:dPr>
+                                <m:begChr m:val="["/>
+                                <m:endChr m:val="]"/>
+                                <m:sepChr m:val=""/>
+                                <m:grow/>
+                              </m:dPr>
+                              <m:e>
+                                <m:r>
+                                  <m:t>i</m:t>
+                                </m:r>
+                                <m:r>
+                                  <m:rPr>
+                                    <m:sty m:val="p"/>
+                                  </m:rPr>
+                                  <m:t>−</m:t>
+                                </m:r>
+                                <m:r>
+                                  <m:t>1</m:t>
+                                </m:r>
+                                <m:r>
+                                  <m:rPr>
+                                    <m:sty m:val="p"/>
+                                  </m:rPr>
+                                  <m:t>,</m:t>
+                                </m:r>
+                                <m:r>
+                                  <m:t>ω</m:t>
+                                </m:r>
+                              </m:e>
+                            </m:d>
+                            <m:r>
+                              <m:rPr>
+                                <m:sty m:val="p"/>
+                              </m:rPr>
+                              <m:t>}</m:t>
+                            </m:r>
+                          </m:e>
+                        </m:mr>
+                        <m:mr>
+                          <m:e/>
+                          <m:e>
+                            <m:r>
+                              <m:t>  </m:t>
+                            </m:r>
+                            <m:r>
+                              <m:t>  </m:t>
+                            </m:r>
+                            <m:r>
+                              <m:rPr>
+                                <m:nor/>
+                                <m:sty m:val="p"/>
+                              </m:rPr>
+                              <m:t>else</m:t>
+                            </m:r>
+                          </m:e>
+                        </m:mr>
+                        <m:mr>
+                          <m:e/>
+                          <m:e>
+                            <m:r>
+                              <m:t>  </m:t>
+                            </m:r>
+                            <m:r>
+                              <m:t>  </m:t>
+                            </m:r>
+                            <m:r>
+                              <m:t> </m:t>
+                            </m:r>
+                            <m:r>
+                              <m:t>c</m:t>
+                            </m:r>
+                            <m:d>
+                              <m:dPr>
+                                <m:begChr m:val="["/>
+                                <m:endChr m:val="]"/>
+                                <m:sepChr m:val=""/>
+                                <m:grow/>
+                              </m:dPr>
+                              <m:e>
+                                <m:r>
+                                  <m:t>i</m:t>
+                                </m:r>
+                                <m:r>
+                                  <m:rPr>
+                                    <m:sty m:val="p"/>
+                                  </m:rPr>
+                                  <m:t>,</m:t>
+                                </m:r>
+                                <m:r>
+                                  <m:t>ω</m:t>
+                                </m:r>
+                              </m:e>
+                            </m:d>
+                            <m:r>
+                              <m:rPr>
+                                <m:sty m:val="p"/>
+                              </m:rPr>
+                              <m:t>←</m:t>
+                            </m:r>
+                            <m:r>
+                              <m:t>c</m:t>
+                            </m:r>
+                            <m:d>
+                              <m:dPr>
+                                <m:begChr m:val="["/>
+                                <m:endChr m:val="]"/>
+                                <m:sepChr m:val=""/>
+                                <m:grow/>
+                              </m:dPr>
+                              <m:e>
+                                <m:r>
+                                  <m:t>i</m:t>
+                                </m:r>
+                                <m:r>
+                                  <m:rPr>
+                                    <m:sty m:val="p"/>
+                                  </m:rPr>
+                                  <m:t>−</m:t>
+                                </m:r>
+                                <m:r>
+                                  <m:t>1</m:t>
+                                </m:r>
+                                <m:r>
+                                  <m:rPr>
+                                    <m:sty m:val="p"/>
+                                  </m:rPr>
+                                  <m:t>,</m:t>
+                                </m:r>
+                                <m:r>
+                                  <m:t>ω</m:t>
+                                </m:r>
+                              </m:e>
+                            </m:d>
+                          </m:e>
+                        </m:mr>
+                        <m:mr>
+                          <m:e/>
+                          <m:e>
+                            <m:r>
+                              <m:t> </m:t>
+                            </m:r>
+                            <m:r>
+                              <m:t>r</m:t>
+                            </m:r>
+                            <m:r>
+                              <m:t>e</m:t>
+                            </m:r>
+                            <m:r>
+                              <m:t>t</m:t>
+                            </m:r>
+                            <m:r>
+                              <m:t>u</m:t>
+                            </m:r>
+                            <m:r>
+                              <m:t>r</m:t>
+                            </m:r>
+                            <m:r>
+                              <m:t>n</m:t>
+                            </m:r>
+                            <m:r>
+                              <m:t> </m:t>
+                            </m:r>
+                            <m:r>
+                              <m:t>c</m:t>
+                            </m:r>
+                            <m:d>
+                              <m:dPr>
+                                <m:begChr m:val="["/>
+                                <m:endChr m:val="]"/>
+                                <m:sepChr m:val=""/>
+                                <m:grow/>
+                              </m:dPr>
+                              <m:e>
+                                <m:r>
+                                  <m:t>m</m:t>
+                                </m:r>
+                                <m:r>
+                                  <m:rPr>
+                                    <m:sty m:val="p"/>
+                                  </m:rPr>
+                                  <m:t>,</m:t>
+                                </m:r>
+                                <m:r>
+                                  <m:t>W</m:t>
+                                </m:r>
+                              </m:e>
+                            </m:d>
+                          </m:e>
+                        </m:mr>
+                      </m:m>
+                    </m:oMath>
+                  </m:oMathPara>
+                </a14:m>
+              </a:p>
+            </p:txBody>
+          </p:sp>
+        </mc:Choice>
+      </mc:AlternateContent>
     </p:spTree>
   </p:cSld>
 </p:sld>
@@ -19786,31 +20557,545 @@
           </a:p>
         </p:txBody>
       </p:sp>
-      <p:sp>
-        <p:nvSpPr>
-          <p:cNvPr id="3" name="Content Placeholder 2"/>
-          <p:cNvSpPr>
-            <a:spLocks noGrp="1"/>
-          </p:cNvSpPr>
-          <p:nvPr>
-            <p:ph idx="1"/>
-          </p:nvPr>
-        </p:nvSpPr>
-        <p:spPr/>
-        <p:txBody>
-          <a:bodyPr/>
-          <a:lstStyle/>
-          <a:p>
-            <a:pPr lvl="0" indent="0" marL="0">
-              <a:buNone/>
-            </a:pPr>
-            <a:r>
-              <a:rPr/>
-              <a:t>$$  $$</a:t>
-            </a:r>
-          </a:p>
-        </p:txBody>
-      </p:sp>
+      <mc:AlternateContent xmlns:mc="http://schemas.openxmlformats.org/markup-compatibility/2006">
+        <mc:Choice xmlns:a14="http://schemas.microsoft.com/office/drawing/2010/main" Requires="a14">
+          <p:sp>
+            <p:nvSpPr>
+              <p:cNvPr id="3" name="Content Placeholder 2"/>
+              <p:cNvSpPr>
+                <a:spLocks noGrp="1"/>
+              </p:cNvSpPr>
+              <p:nvPr>
+                <p:ph idx="1"/>
+              </p:nvPr>
+            </p:nvSpPr>
+            <p:spPr/>
+            <p:txBody>
+              <a:bodyPr/>
+              <a:lstStyle/>
+              <a:p>
+                <a:pPr lvl="0" indent="0" marL="0">
+                  <a:buNone/>
+                </a:pPr>
+                <a14:m>
+                  <m:oMathPara xmlns:m="http://schemas.openxmlformats.org/officeDocument/2006/math">
+                    <m:oMathParaPr>
+                      <m:jc m:val="center"/>
+                    </m:oMathParaPr>
+                    <m:oMath>
+                      <m:m>
+                        <m:mPr>
+                          <m:baseJc m:val="center"/>
+                          <m:plcHide m:val="1"/>
+                          <m:mcs>
+                            <m:mc>
+                              <m:mcPr>
+                                <m:mcJc m:val="right"/>
+                                <m:count m:val="1"/>
+                              </m:mcPr>
+                            </m:mc>
+                            <m:mc>
+                              <m:mcPr>
+                                <m:mcJc m:val="left"/>
+                                <m:count m:val="1"/>
+                              </m:mcPr>
+                            </m:mc>
+                          </m:mcs>
+                        </m:mPr>
+                        <m:mr>
+                          <m:e/>
+                          <m:e>
+                            <m:r>
+                              <m:rPr>
+                                <m:nor/>
+                                <m:sty m:val="p"/>
+                              </m:rPr>
+                              <m:t>SOLKNAP0-1</m:t>
+                            </m:r>
+                            <m:d>
+                              <m:dPr>
+                                <m:begChr m:val="("/>
+                                <m:endChr m:val=")"/>
+                                <m:sepChr m:val=""/>
+                                <m:grow/>
+                              </m:dPr>
+                              <m:e>
+                                <m:r>
+                                  <m:t>a</m:t>
+                                </m:r>
+                                <m:r>
+                                  <m:rPr>
+                                    <m:sty m:val="p"/>
+                                  </m:rPr>
+                                  <m:t>,</m:t>
+                                </m:r>
+                                <m:r>
+                                  <m:t>v</m:t>
+                                </m:r>
+                                <m:r>
+                                  <m:rPr>
+                                    <m:sty m:val="p"/>
+                                  </m:rPr>
+                                  <m:t>,</m:t>
+                                </m:r>
+                                <m:r>
+                                  <m:t>w</m:t>
+                                </m:r>
+                                <m:r>
+                                  <m:rPr>
+                                    <m:sty m:val="p"/>
+                                  </m:rPr>
+                                  <m:t>,</m:t>
+                                </m:r>
+                                <m:r>
+                                  <m:t>n</m:t>
+                                </m:r>
+                                <m:r>
+                                  <m:rPr>
+                                    <m:sty m:val="p"/>
+                                  </m:rPr>
+                                  <m:t>,</m:t>
+                                </m:r>
+                                <m:r>
+                                  <m:t>W</m:t>
+                                </m:r>
+                                <m:r>
+                                  <m:rPr>
+                                    <m:sty m:val="p"/>
+                                  </m:rPr>
+                                  <m:t>,</m:t>
+                                </m:r>
+                                <m:r>
+                                  <m:t>c</m:t>
+                                </m:r>
+                              </m:e>
+                            </m:d>
+                          </m:e>
+                        </m:mr>
+                        <m:mr>
+                          <m:e/>
+                          <m:e>
+                            <m:r>
+                              <m:t> </m:t>
+                            </m:r>
+                            <m:r>
+                              <m:t>i</m:t>
+                            </m:r>
+                            <m:r>
+                              <m:rPr>
+                                <m:sty m:val="p"/>
+                              </m:rPr>
+                              <m:t>←</m:t>
+                            </m:r>
+                            <m:r>
+                              <m:t>n</m:t>
+                            </m:r>
+                            <m:r>
+                              <m:rPr>
+                                <m:sty m:val="p"/>
+                              </m:rPr>
+                              <m:t>;</m:t>
+                            </m:r>
+                            <m:r>
+                              <m:t>ω</m:t>
+                            </m:r>
+                            <m:r>
+                              <m:rPr>
+                                <m:sty m:val="p"/>
+                              </m:rPr>
+                              <m:t>←</m:t>
+                            </m:r>
+                            <m:r>
+                              <m:t>W</m:t>
+                            </m:r>
+                          </m:e>
+                        </m:mr>
+                        <m:mr>
+                          <m:e/>
+                          <m:e>
+                            <m:r>
+                              <m:t> </m:t>
+                            </m:r>
+                            <m:r>
+                              <m:t>S</m:t>
+                            </m:r>
+                            <m:r>
+                              <m:rPr>
+                                <m:sty m:val="p"/>
+                              </m:rPr>
+                              <m:t>←</m:t>
+                            </m:r>
+                            <m:r>
+                              <m:rPr>
+                                <m:sty m:val="p"/>
+                              </m:rPr>
+                              <m:t>∅</m:t>
+                            </m:r>
+                          </m:e>
+                        </m:mr>
+                        <m:mr>
+                          <m:e/>
+                          <m:e>
+                            <m:r>
+                              <m:t> </m:t>
+                            </m:r>
+                            <m:r>
+                              <m:t>w</m:t>
+                            </m:r>
+                            <m:r>
+                              <m:t>h</m:t>
+                            </m:r>
+                            <m:r>
+                              <m:t>i</m:t>
+                            </m:r>
+                            <m:r>
+                              <m:t>l</m:t>
+                            </m:r>
+                            <m:r>
+                              <m:t>e</m:t>
+                            </m:r>
+                            <m:r>
+                              <m:t> </m:t>
+                            </m:r>
+                            <m:r>
+                              <m:t>i</m:t>
+                            </m:r>
+                            <m:r>
+                              <m:rPr>
+                                <m:sty m:val="p"/>
+                              </m:rPr>
+                              <m:t>←</m:t>
+                            </m:r>
+                            <m:r>
+                              <m:t>0</m:t>
+                            </m:r>
+                            <m:r>
+                              <m:t> </m:t>
+                            </m:r>
+                            <m:r>
+                              <m:t>d</m:t>
+                            </m:r>
+                            <m:r>
+                              <m:t>o</m:t>
+                            </m:r>
+                          </m:e>
+                        </m:mr>
+                        <m:mr>
+                          <m:e/>
+                          <m:e>
+                            <m:r>
+                              <m:t>  </m:t>
+                            </m:r>
+                            <m:r>
+                              <m:t>i</m:t>
+                            </m:r>
+                            <m:r>
+                              <m:t>f</m:t>
+                            </m:r>
+                            <m:r>
+                              <m:t> </m:t>
+                            </m:r>
+                            <m:r>
+                              <m:t>c</m:t>
+                            </m:r>
+                            <m:d>
+                              <m:dPr>
+                                <m:begChr m:val="["/>
+                                <m:endChr m:val="]"/>
+                                <m:sepChr m:val=""/>
+                                <m:grow/>
+                              </m:dPr>
+                              <m:e>
+                                <m:r>
+                                  <m:t>i</m:t>
+                                </m:r>
+                                <m:r>
+                                  <m:rPr>
+                                    <m:sty m:val="p"/>
+                                  </m:rPr>
+                                  <m:t>,</m:t>
+                                </m:r>
+                                <m:r>
+                                  <m:t>ω</m:t>
+                                </m:r>
+                              </m:e>
+                            </m:d>
+                            <m:r>
+                              <m:rPr>
+                                <m:sty m:val="p"/>
+                              </m:rPr>
+                              <m:t>=</m:t>
+                            </m:r>
+                            <m:r>
+                              <m:t>c</m:t>
+                            </m:r>
+                            <m:d>
+                              <m:dPr>
+                                <m:begChr m:val="["/>
+                                <m:endChr m:val="]"/>
+                                <m:sepChr m:val=""/>
+                                <m:grow/>
+                              </m:dPr>
+                              <m:e>
+                                <m:r>
+                                  <m:t>i</m:t>
+                                </m:r>
+                                <m:r>
+                                  <m:rPr>
+                                    <m:sty m:val="p"/>
+                                  </m:rPr>
+                                  <m:t>−</m:t>
+                                </m:r>
+                                <m:r>
+                                  <m:t>1</m:t>
+                                </m:r>
+                                <m:r>
+                                  <m:rPr>
+                                    <m:sty m:val="p"/>
+                                  </m:rPr>
+                                  <m:t>,</m:t>
+                                </m:r>
+                                <m:r>
+                                  <m:t>ω</m:t>
+                                </m:r>
+                              </m:e>
+                            </m:d>
+                            <m:r>
+                              <m:t> </m:t>
+                            </m:r>
+                            <m:r>
+                              <m:t>t</m:t>
+                            </m:r>
+                            <m:r>
+                              <m:t>h</m:t>
+                            </m:r>
+                            <m:r>
+                              <m:t>e</m:t>
+                            </m:r>
+                            <m:r>
+                              <m:t>n</m:t>
+                            </m:r>
+                          </m:e>
+                        </m:mr>
+                        <m:mr>
+                          <m:e/>
+                          <m:e>
+                            <m:r>
+                              <m:t>  </m:t>
+                            </m:r>
+                            <m:r>
+                              <m:t> </m:t>
+                            </m:r>
+                            <m:r>
+                              <m:t>i</m:t>
+                            </m:r>
+                            <m:r>
+                              <m:rPr>
+                                <m:sty m:val="p"/>
+                              </m:rPr>
+                              <m:t>←</m:t>
+                            </m:r>
+                            <m:r>
+                              <m:t>i</m:t>
+                            </m:r>
+                            <m:r>
+                              <m:rPr>
+                                <m:sty m:val="p"/>
+                              </m:rPr>
+                              <m:t>−</m:t>
+                            </m:r>
+                            <m:r>
+                              <m:t>1</m:t>
+                            </m:r>
+                          </m:e>
+                        </m:mr>
+                        <m:mr>
+                          <m:e/>
+                          <m:e>
+                            <m:r>
+                              <m:t>  </m:t>
+                            </m:r>
+                            <m:r>
+                              <m:t>e</m:t>
+                            </m:r>
+                            <m:r>
+                              <m:t>l</m:t>
+                            </m:r>
+                            <m:r>
+                              <m:t>s</m:t>
+                            </m:r>
+                            <m:r>
+                              <m:t>e</m:t>
+                            </m:r>
+                          </m:e>
+                        </m:mr>
+                        <m:mr>
+                          <m:e/>
+                          <m:e>
+                            <m:r>
+                              <m:t>  </m:t>
+                            </m:r>
+                            <m:r>
+                              <m:t> </m:t>
+                            </m:r>
+                            <m:r>
+                              <m:t>S</m:t>
+                            </m:r>
+                            <m:r>
+                              <m:rPr>
+                                <m:sty m:val="p"/>
+                              </m:rPr>
+                              <m:t>←</m:t>
+                            </m:r>
+                            <m:r>
+                              <m:t>S</m:t>
+                            </m:r>
+                            <m:r>
+                              <m:rPr>
+                                <m:sty m:val="p"/>
+                              </m:rPr>
+                              <m:t>∪</m:t>
+                            </m:r>
+                            <m:r>
+                              <m:rPr>
+                                <m:sty m:val="p"/>
+                              </m:rPr>
+                              <m:t>{</m:t>
+                            </m:r>
+                            <m:sSub>
+                              <m:e>
+                                <m:r>
+                                  <m:t>a</m:t>
+                                </m:r>
+                              </m:e>
+                              <m:sub>
+                                <m:r>
+                                  <m:t>i</m:t>
+                                </m:r>
+                              </m:sub>
+                            </m:sSub>
+                            <m:r>
+                              <m:rPr>
+                                <m:sty m:val="p"/>
+                              </m:rPr>
+                              <m:t>}</m:t>
+                            </m:r>
+                          </m:e>
+                        </m:mr>
+                        <m:mr>
+                          <m:e/>
+                          <m:e>
+                            <m:r>
+                              <m:t>  </m:t>
+                            </m:r>
+                            <m:r>
+                              <m:t> </m:t>
+                            </m:r>
+                            <m:r>
+                              <m:t>ω</m:t>
+                            </m:r>
+                            <m:r>
+                              <m:rPr>
+                                <m:sty m:val="p"/>
+                              </m:rPr>
+                              <m:t>←</m:t>
+                            </m:r>
+                            <m:r>
+                              <m:t>ω</m:t>
+                            </m:r>
+                            <m:r>
+                              <m:rPr>
+                                <m:sty m:val="p"/>
+                              </m:rPr>
+                              <m:t>−</m:t>
+                            </m:r>
+                            <m:sSub>
+                              <m:e>
+                                <m:r>
+                                  <m:t>w</m:t>
+                                </m:r>
+                              </m:e>
+                              <m:sub>
+                                <m:r>
+                                  <m:t>i</m:t>
+                                </m:r>
+                              </m:sub>
+                            </m:sSub>
+                          </m:e>
+                        </m:mr>
+                        <m:mr>
+                          <m:e/>
+                          <m:e>
+                            <m:r>
+                              <m:t>  </m:t>
+                            </m:r>
+                            <m:r>
+                              <m:t> </m:t>
+                            </m:r>
+                            <m:r>
+                              <m:t>i</m:t>
+                            </m:r>
+                            <m:r>
+                              <m:rPr>
+                                <m:sty m:val="p"/>
+                              </m:rPr>
+                              <m:t>←</m:t>
+                            </m:r>
+                            <m:r>
+                              <m:t>i</m:t>
+                            </m:r>
+                            <m:r>
+                              <m:rPr>
+                                <m:sty m:val="p"/>
+                              </m:rPr>
+                              <m:t>−</m:t>
+                            </m:r>
+                            <m:r>
+                              <m:t>1</m:t>
+                            </m:r>
+                          </m:e>
+                        </m:mr>
+                        <m:mr>
+                          <m:e/>
+                          <m:e>
+                            <m:r>
+                              <m:t> </m:t>
+                            </m:r>
+                            <m:r>
+                              <m:t>r</m:t>
+                            </m:r>
+                            <m:r>
+                              <m:t>e</m:t>
+                            </m:r>
+                            <m:r>
+                              <m:t>t</m:t>
+                            </m:r>
+                            <m:r>
+                              <m:t>u</m:t>
+                            </m:r>
+                            <m:r>
+                              <m:t>r</m:t>
+                            </m:r>
+                            <m:r>
+                              <m:t>n</m:t>
+                            </m:r>
+                            <m:r>
+                              <m:t> </m:t>
+                            </m:r>
+                            <m:r>
+                              <m:t>S</m:t>
+                            </m:r>
+                          </m:e>
+                        </m:mr>
+                      </m:m>
+                    </m:oMath>
+                  </m:oMathPara>
+                </a14:m>
+              </a:p>
+            </p:txBody>
+          </p:sp>
+        </mc:Choice>
+      </mc:AlternateContent>
     </p:spTree>
   </p:cSld>
 </p:sld>

</xml_diff>